<commit_message>
More code samples and lecture slides on iostreams and adapters
git-svn-id: https://svn.code.sf.net/p/cpp-lects-rus/code/trunk@249 39143b06-f351-456c-9f92-4cd32fad6823
</commit_message>
<xml_diff>
--- a/slides/sep2016/lec2-5-iostreams-locales.pptx
+++ b/slides/sep2016/lec2-5-iostreams-locales.pptx
@@ -388,7 +388,7 @@
             <a:fld id="{96DFF08F-DC6B-4601-B491-B0F83F6DD2DA}" type="datetimeFigureOut">
               <a:rPr lang="en-US"/>
               <a:pPr/>
-              <a:t>3/11/2017</a:t>
+              <a:t>3/5/2018</a:t>
             </a:fld>
             <a:endParaRPr lang="en-US"/>
           </a:p>
@@ -605,7 +605,7 @@
           <a:p>
             <a:fld id="{96DFF08F-DC6B-4601-B491-B0F83F6DD2DA}" type="datetimeFigureOut">
               <a:rPr lang="en-US"/>
-              <a:t>3/11/2017</a:t>
+              <a:t>3/5/2018</a:t>
             </a:fld>
             <a:endParaRPr lang="en-US"/>
           </a:p>
@@ -780,7 +780,7 @@
           <a:p>
             <a:fld id="{96DFF08F-DC6B-4601-B491-B0F83F6DD2DA}" type="datetimeFigureOut">
               <a:rPr lang="en-US"/>
-              <a:t>3/11/2017</a:t>
+              <a:t>3/5/2018</a:t>
             </a:fld>
             <a:endParaRPr lang="en-US"/>
           </a:p>
@@ -945,7 +945,7 @@
           <a:p>
             <a:fld id="{96DFF08F-DC6B-4601-B491-B0F83F6DD2DA}" type="datetimeFigureOut">
               <a:rPr lang="en-US"/>
-              <a:t>3/11/2017</a:t>
+              <a:t>3/5/2018</a:t>
             </a:fld>
             <a:endParaRPr lang="en-US"/>
           </a:p>
@@ -1191,7 +1191,7 @@
           <a:p>
             <a:fld id="{96DFF08F-DC6B-4601-B491-B0F83F6DD2DA}" type="datetimeFigureOut">
               <a:rPr lang="en-US"/>
-              <a:t>3/11/2017</a:t>
+              <a:t>3/5/2018</a:t>
             </a:fld>
             <a:endParaRPr lang="en-US"/>
           </a:p>
@@ -1509,7 +1509,7 @@
           <a:p>
             <a:fld id="{96DFF08F-DC6B-4601-B491-B0F83F6DD2DA}" type="datetimeFigureOut">
               <a:rPr lang="en-US"/>
-              <a:t>3/11/2017</a:t>
+              <a:t>3/5/2018</a:t>
             </a:fld>
             <a:endParaRPr lang="en-US"/>
           </a:p>
@@ -1928,7 +1928,7 @@
           <a:p>
             <a:fld id="{96DFF08F-DC6B-4601-B491-B0F83F6DD2DA}" type="datetimeFigureOut">
               <a:rPr lang="en-US"/>
-              <a:t>3/11/2017</a:t>
+              <a:t>3/5/2018</a:t>
             </a:fld>
             <a:endParaRPr lang="en-US"/>
           </a:p>
@@ -2041,7 +2041,7 @@
           <a:p>
             <a:fld id="{96DFF08F-DC6B-4601-B491-B0F83F6DD2DA}" type="datetimeFigureOut">
               <a:rPr lang="en-US"/>
-              <a:t>3/11/2017</a:t>
+              <a:t>3/5/2018</a:t>
             </a:fld>
             <a:endParaRPr lang="en-US"/>
           </a:p>
@@ -2131,7 +2131,7 @@
           <a:p>
             <a:fld id="{96DFF08F-DC6B-4601-B491-B0F83F6DD2DA}" type="datetimeFigureOut">
               <a:rPr lang="en-US"/>
-              <a:t>3/11/2017</a:t>
+              <a:t>3/5/2018</a:t>
             </a:fld>
             <a:endParaRPr lang="en-US"/>
           </a:p>
@@ -2416,7 +2416,7 @@
           <a:p>
             <a:fld id="{96DFF08F-DC6B-4601-B491-B0F83F6DD2DA}" type="datetimeFigureOut">
               <a:rPr lang="en-US"/>
-              <a:t>3/11/2017</a:t>
+              <a:t>3/5/2018</a:t>
             </a:fld>
             <a:endParaRPr lang="en-US"/>
           </a:p>
@@ -2683,7 +2683,7 @@
           <a:p>
             <a:fld id="{96DFF08F-DC6B-4601-B491-B0F83F6DD2DA}" type="datetimeFigureOut">
               <a:rPr lang="en-US"/>
-              <a:t>3/11/2017</a:t>
+              <a:t>3/5/2018</a:t>
             </a:fld>
             <a:endParaRPr lang="en-US"/>
           </a:p>
@@ -2932,7 +2932,7 @@
             <a:fld id="{96DFF08F-DC6B-4601-B491-B0F83F6DD2DA}" type="datetimeFigureOut">
               <a:rPr lang="en-US"/>
               <a:pPr/>
-              <a:t>3/11/2017</a:t>
+              <a:t>3/5/2018</a:t>
             </a:fld>
             <a:endParaRPr lang="en-US"/>
           </a:p>

</xml_diff>